<commit_message>
Update version control lesson
</commit_message>
<xml_diff>
--- a/Working/2_VersionControl/2_VersionControl.pptx
+++ b/Working/2_VersionControl/2_VersionControl.pptx
@@ -9,10 +9,12 @@
     <p:sldId id="258" r:id="rId3"/>
     <p:sldId id="259" r:id="rId4"/>
     <p:sldId id="260" r:id="rId5"/>
-    <p:sldId id="261" r:id="rId6"/>
-    <p:sldId id="262" r:id="rId7"/>
-    <p:sldId id="263" r:id="rId8"/>
-    <p:sldId id="264" r:id="rId9"/>
+    <p:sldId id="265" r:id="rId6"/>
+    <p:sldId id="261" r:id="rId7"/>
+    <p:sldId id="267" r:id="rId8"/>
+    <p:sldId id="262" r:id="rId9"/>
+    <p:sldId id="263" r:id="rId10"/>
+    <p:sldId id="264" r:id="rId11"/>
   </p:sldIdLst>
   <p:sldSz cx="12192000" cy="6858000"/>
   <p:notesSz cx="6858000" cy="9144000"/>
@@ -124,11 +126,13 @@
         <p14:section name="Git" id="{68BED324-F9FD-4188-88A7-FA3A1338DAA4}">
           <p14:sldIdLst>
             <p14:sldId id="260"/>
+            <p14:sldId id="265"/>
           </p14:sldIdLst>
         </p14:section>
         <p14:section name="GitHub" id="{495F8D3B-6743-4832-8BD4-752D8F1E4750}">
           <p14:sldIdLst>
             <p14:sldId id="261"/>
+            <p14:sldId id="267"/>
           </p14:sldIdLst>
         </p14:section>
         <p14:section name="Setup" id="{92AEE623-99BD-4217-A0F8-0D2FB3C2A157}">
@@ -3912,6 +3916,86 @@
 </p:sld>
 </file>
 
+<file path=ppt/slides/slide10.xml><?xml version="1.0" encoding="utf-8"?>
+<p:sld xmlns:a="http://schemas.openxmlformats.org/drawingml/2006/main" xmlns:r="http://schemas.openxmlformats.org/officeDocument/2006/relationships" xmlns:p="http://schemas.openxmlformats.org/presentationml/2006/main">
+  <p:cSld>
+    <p:spTree>
+      <p:nvGrpSpPr>
+        <p:cNvPr id="1" name=""/>
+        <p:cNvGrpSpPr/>
+        <p:nvPr/>
+      </p:nvGrpSpPr>
+      <p:grpSpPr>
+        <a:xfrm>
+          <a:off x="0" y="0"/>
+          <a:ext cx="0" cy="0"/>
+          <a:chOff x="0" y="0"/>
+          <a:chExt cx="0" cy="0"/>
+        </a:xfrm>
+      </p:grpSpPr>
+      <p:sp>
+        <p:nvSpPr>
+          <p:cNvPr id="2" name="Title 1">
+            <a:extLst>
+              <a:ext uri="{FF2B5EF4-FFF2-40B4-BE49-F238E27FC236}">
+                <a16:creationId xmlns:a16="http://schemas.microsoft.com/office/drawing/2014/main" id="{4DF178C7-120D-4AE8-B26F-BFA3959D9798}"/>
+              </a:ext>
+            </a:extLst>
+          </p:cNvPr>
+          <p:cNvSpPr>
+            <a:spLocks noGrp="1"/>
+          </p:cNvSpPr>
+          <p:nvPr>
+            <p:ph type="title"/>
+          </p:nvPr>
+        </p:nvSpPr>
+        <p:spPr/>
+        <p:txBody>
+          <a:bodyPr/>
+          <a:lstStyle/>
+          <a:p>
+            <a:endParaRPr lang="en-US"/>
+          </a:p>
+        </p:txBody>
+      </p:sp>
+      <p:sp>
+        <p:nvSpPr>
+          <p:cNvPr id="3" name="Content Placeholder 2">
+            <a:extLst>
+              <a:ext uri="{FF2B5EF4-FFF2-40B4-BE49-F238E27FC236}">
+                <a16:creationId xmlns:a16="http://schemas.microsoft.com/office/drawing/2014/main" id="{C36822C3-41DF-469F-8956-912A332FA942}"/>
+              </a:ext>
+            </a:extLst>
+          </p:cNvPr>
+          <p:cNvSpPr>
+            <a:spLocks noGrp="1"/>
+          </p:cNvSpPr>
+          <p:nvPr>
+            <p:ph idx="1"/>
+          </p:nvPr>
+        </p:nvSpPr>
+        <p:spPr/>
+        <p:txBody>
+          <a:bodyPr/>
+          <a:lstStyle/>
+          <a:p>
+            <a:endParaRPr lang="en-US"/>
+          </a:p>
+        </p:txBody>
+      </p:sp>
+    </p:spTree>
+    <p:extLst>
+      <p:ext uri="{BB962C8B-B14F-4D97-AF65-F5344CB8AC3E}">
+        <p14:creationId xmlns:p14="http://schemas.microsoft.com/office/powerpoint/2010/main" val="3310373015"/>
+      </p:ext>
+    </p:extLst>
+  </p:cSld>
+  <p:clrMapOvr>
+    <a:masterClrMapping/>
+  </p:clrMapOvr>
+</p:sld>
+</file>
+
 <file path=ppt/slides/slide2.xml><?xml version="1.0" encoding="utf-8"?>
 <p:sld xmlns:a="http://schemas.openxmlformats.org/drawingml/2006/main" xmlns:r="http://schemas.openxmlformats.org/officeDocument/2006/relationships" xmlns:p="http://schemas.openxmlformats.org/presentationml/2006/main">
   <p:cSld>
@@ -4336,7 +4420,10 @@
           <a:bodyPr/>
           <a:lstStyle/>
           <a:p>
-            <a:endParaRPr lang="en-US"/>
+            <a:r>
+              <a:rPr lang="en-US" dirty="0"/>
+              <a:t>Introduction to Git</a:t>
+            </a:r>
           </a:p>
         </p:txBody>
       </p:sp>
@@ -4356,15 +4443,231 @@
             <p:ph idx="1"/>
           </p:nvPr>
         </p:nvSpPr>
-        <p:spPr/>
+        <p:spPr>
+          <a:xfrm>
+            <a:off x="1097280" y="1845734"/>
+            <a:ext cx="5279872" cy="4023360"/>
+          </a:xfrm>
+        </p:spPr>
         <p:txBody>
           <a:bodyPr/>
           <a:lstStyle/>
           <a:p>
-            <a:endParaRPr lang="en-US"/>
-          </a:p>
-        </p:txBody>
-      </p:sp>
+            <a:r>
+              <a:rPr lang="en-US" dirty="0"/>
+              <a:t>Most widely-used version control system</a:t>
+            </a:r>
+          </a:p>
+          <a:p>
+            <a:pPr lvl="1"/>
+            <a:r>
+              <a:rPr lang="en-US" dirty="0"/>
+              <a:t>Completely open-source system developed by </a:t>
+            </a:r>
+            <a:r>
+              <a:rPr lang="en-US" dirty="0">
+                <a:hlinkClick r:id="rId2"/>
+              </a:rPr>
+              <a:t>Linus Torvalds</a:t>
+            </a:r>
+            <a:r>
+              <a:rPr lang="en-US" dirty="0"/>
+              <a:t> (who also created Linux) in 2005</a:t>
+            </a:r>
+          </a:p>
+          <a:p>
+            <a:r>
+              <a:rPr lang="en-US" dirty="0"/>
+              <a:t>What does Git do? </a:t>
+            </a:r>
+          </a:p>
+          <a:p>
+            <a:pPr lvl="1"/>
+            <a:r>
+              <a:rPr lang="en-US" dirty="0"/>
+              <a:t>Manage coding projects using repositories</a:t>
+            </a:r>
+          </a:p>
+          <a:p>
+            <a:pPr lvl="1"/>
+            <a:r>
+              <a:rPr lang="en-US" dirty="0"/>
+              <a:t>Controls &amp; tracks changing w/ staging &amp; committing</a:t>
+            </a:r>
+          </a:p>
+          <a:p>
+            <a:pPr lvl="1"/>
+            <a:r>
+              <a:rPr lang="en-US" b="1" dirty="0"/>
+              <a:t>Enables code revision &amp; updates w/o the risk of breaking code by branching &amp; merging</a:t>
+            </a:r>
+          </a:p>
+          <a:p>
+            <a:pPr lvl="1"/>
+            <a:r>
+              <a:rPr lang="en-US" dirty="0"/>
+              <a:t>Provides a local working copy via cloning (not like working on a Google doc, for example)</a:t>
+            </a:r>
+          </a:p>
+        </p:txBody>
+      </p:sp>
+      <p:sp>
+        <p:nvSpPr>
+          <p:cNvPr id="4" name="TextBox 3">
+            <a:extLst>
+              <a:ext uri="{FF2B5EF4-FFF2-40B4-BE49-F238E27FC236}">
+                <a16:creationId xmlns:a16="http://schemas.microsoft.com/office/drawing/2014/main" id="{EAC0B4CC-3F33-467D-988C-24B972522563}"/>
+              </a:ext>
+            </a:extLst>
+          </p:cNvPr>
+          <p:cNvSpPr txBox="1"/>
+          <p:nvPr/>
+        </p:nvSpPr>
+        <p:spPr>
+          <a:xfrm>
+            <a:off x="0" y="6432897"/>
+            <a:ext cx="6936828" cy="276999"/>
+          </a:xfrm>
+          <a:prstGeom prst="rect">
+            <a:avLst/>
+          </a:prstGeom>
+          <a:noFill/>
+        </p:spPr>
+        <p:txBody>
+          <a:bodyPr wrap="square" rtlCol="0">
+            <a:spAutoFit/>
+          </a:bodyPr>
+          <a:lstStyle/>
+          <a:p>
+            <a:r>
+              <a:rPr lang="en-US" sz="1200" dirty="0">
+                <a:solidFill>
+                  <a:schemeClr val="bg2"/>
+                </a:solidFill>
+              </a:rPr>
+              <a:t>Sources: </a:t>
+            </a:r>
+            <a:r>
+              <a:rPr lang="en-US" sz="1200" dirty="0">
+                <a:solidFill>
+                  <a:schemeClr val="bg2"/>
+                </a:solidFill>
+                <a:hlinkClick r:id="rId3">
+                  <a:extLst>
+                    <a:ext uri="{A12FA001-AC4F-418D-AE19-62706E023703}">
+                      <ahyp:hlinkClr xmlns:ahyp="http://schemas.microsoft.com/office/drawing/2018/hyperlinkcolor" val="tx"/>
+                    </a:ext>
+                  </a:extLst>
+                </a:hlinkClick>
+              </a:rPr>
+              <a:t>https://git-scm.com/</a:t>
+            </a:r>
+            <a:r>
+              <a:rPr lang="en-US" sz="1200" dirty="0">
+                <a:solidFill>
+                  <a:schemeClr val="bg2"/>
+                </a:solidFill>
+              </a:rPr>
+              <a:t>, </a:t>
+            </a:r>
+            <a:r>
+              <a:rPr lang="en-US" sz="1200" dirty="0">
+                <a:solidFill>
+                  <a:schemeClr val="bg2"/>
+                </a:solidFill>
+                <a:hlinkClick r:id="rId4">
+                  <a:extLst>
+                    <a:ext uri="{A12FA001-AC4F-418D-AE19-62706E023703}">
+                      <ahyp:hlinkClr xmlns:ahyp="http://schemas.microsoft.com/office/drawing/2018/hyperlinkcolor" val="tx"/>
+                    </a:ext>
+                  </a:extLst>
+                </a:hlinkClick>
+              </a:rPr>
+              <a:t>https://www.w3schools.com/git/git_intro.asp?remote=github</a:t>
+            </a:r>
+            <a:r>
+              <a:rPr lang="en-US" sz="1200" dirty="0">
+                <a:solidFill>
+                  <a:schemeClr val="bg2"/>
+                </a:solidFill>
+              </a:rPr>
+              <a:t>  </a:t>
+            </a:r>
+          </a:p>
+        </p:txBody>
+      </p:sp>
+      <p:pic>
+        <p:nvPicPr>
+          <p:cNvPr id="6" name="Picture 5" descr="A picture containing text, indoor, toy&#10;&#10;Description automatically generated">
+            <a:extLst>
+              <a:ext uri="{FF2B5EF4-FFF2-40B4-BE49-F238E27FC236}">
+                <a16:creationId xmlns:a16="http://schemas.microsoft.com/office/drawing/2014/main" id="{89A5737A-AEF6-4558-A5C6-403E4DB20C15}"/>
+              </a:ext>
+            </a:extLst>
+          </p:cNvPr>
+          <p:cNvPicPr>
+            <a:picLocks noChangeAspect="1"/>
+          </p:cNvPicPr>
+          <p:nvPr/>
+        </p:nvPicPr>
+        <p:blipFill>
+          <a:blip r:embed="rId5">
+            <a:extLst>
+              <a:ext uri="{28A0092B-C50C-407E-A947-70E740481C1C}">
+                <a14:useLocalDpi xmlns:a14="http://schemas.microsoft.com/office/drawing/2010/main" val="0"/>
+              </a:ext>
+            </a:extLst>
+          </a:blip>
+          <a:stretch>
+            <a:fillRect/>
+          </a:stretch>
+        </p:blipFill>
+        <p:spPr>
+          <a:xfrm>
+            <a:off x="6643662" y="2357284"/>
+            <a:ext cx="4512018" cy="3000259"/>
+          </a:xfrm>
+          <a:prstGeom prst="rect">
+            <a:avLst/>
+          </a:prstGeom>
+        </p:spPr>
+      </p:pic>
+      <p:pic>
+        <p:nvPicPr>
+          <p:cNvPr id="8" name="Picture 7">
+            <a:extLst>
+              <a:ext uri="{FF2B5EF4-FFF2-40B4-BE49-F238E27FC236}">
+                <a16:creationId xmlns:a16="http://schemas.microsoft.com/office/drawing/2014/main" id="{21F884C3-1062-492F-ABA2-748BE7189B28}"/>
+              </a:ext>
+            </a:extLst>
+          </p:cNvPr>
+          <p:cNvPicPr>
+            <a:picLocks noChangeAspect="1"/>
+          </p:cNvPicPr>
+          <p:nvPr/>
+        </p:nvPicPr>
+        <p:blipFill>
+          <a:blip r:embed="rId6">
+            <a:extLst>
+              <a:ext uri="{28A0092B-C50C-407E-A947-70E740481C1C}">
+                <a14:useLocalDpi xmlns:a14="http://schemas.microsoft.com/office/drawing/2010/main" val="0"/>
+              </a:ext>
+            </a:extLst>
+          </a:blip>
+          <a:stretch>
+            <a:fillRect/>
+          </a:stretch>
+        </p:blipFill>
+        <p:spPr>
+          <a:xfrm>
+            <a:off x="10006271" y="1011981"/>
+            <a:ext cx="1149409" cy="558829"/>
+          </a:xfrm>
+          <a:prstGeom prst="rect">
+            <a:avLst/>
+          </a:prstGeom>
+        </p:spPr>
+      </p:pic>
     </p:spTree>
     <p:extLst>
       <p:ext uri="{BB962C8B-B14F-4D97-AF65-F5344CB8AC3E}">
@@ -4400,7 +4703,7 @@
           <p:cNvPr id="2" name="Title 1">
             <a:extLst>
               <a:ext uri="{FF2B5EF4-FFF2-40B4-BE49-F238E27FC236}">
-                <a16:creationId xmlns:a16="http://schemas.microsoft.com/office/drawing/2014/main" id="{4DF178C7-120D-4AE8-B26F-BFA3959D9798}"/>
+                <a16:creationId xmlns:a16="http://schemas.microsoft.com/office/drawing/2014/main" id="{668E2C93-B06E-481A-AFEC-427F69B38D40}"/>
               </a:ext>
             </a:extLst>
           </p:cNvPr>
@@ -4416,7 +4719,10 @@
           <a:bodyPr/>
           <a:lstStyle/>
           <a:p>
-            <a:endParaRPr lang="en-US"/>
+            <a:r>
+              <a:rPr lang="en-US" dirty="0"/>
+              <a:t>…but how does Git work? </a:t>
+            </a:r>
           </a:p>
         </p:txBody>
       </p:sp>
@@ -4425,7 +4731,7 @@
           <p:cNvPr id="3" name="Content Placeholder 2">
             <a:extLst>
               <a:ext uri="{FF2B5EF4-FFF2-40B4-BE49-F238E27FC236}">
-                <a16:creationId xmlns:a16="http://schemas.microsoft.com/office/drawing/2014/main" id="{C36822C3-41DF-469F-8956-912A332FA942}"/>
+                <a16:creationId xmlns:a16="http://schemas.microsoft.com/office/drawing/2014/main" id="{7F348622-0CE5-4122-833A-2F04B270CA31}"/>
               </a:ext>
             </a:extLst>
           </p:cNvPr>
@@ -4436,19 +4742,192 @@
             <p:ph idx="1"/>
           </p:nvPr>
         </p:nvSpPr>
-        <p:spPr/>
+        <p:spPr>
+          <a:xfrm>
+            <a:off x="1097280" y="1845734"/>
+            <a:ext cx="5839548" cy="4023360"/>
+          </a:xfrm>
+        </p:spPr>
         <p:txBody>
           <a:bodyPr/>
           <a:lstStyle/>
           <a:p>
-            <a:endParaRPr lang="en-US"/>
-          </a:p>
-        </p:txBody>
-      </p:sp>
+            <a:r>
+              <a:rPr lang="en-US" dirty="0"/>
+              <a:t>Three primary components:</a:t>
+            </a:r>
+          </a:p>
+          <a:p>
+            <a:pPr lvl="1"/>
+            <a:r>
+              <a:rPr lang="en-US" b="1" dirty="0"/>
+              <a:t>Working directory </a:t>
+            </a:r>
+            <a:r>
+              <a:rPr lang="en-US" dirty="0"/>
+              <a:t>– Where changes are made</a:t>
+            </a:r>
+          </a:p>
+          <a:p>
+            <a:pPr lvl="1"/>
+            <a:r>
+              <a:rPr lang="en-US" b="1" dirty="0"/>
+              <a:t>Staging area </a:t>
+            </a:r>
+            <a:r>
+              <a:rPr lang="en-US" dirty="0"/>
+              <a:t>– Where changes are indexed (accounted for) &amp; prepared for application</a:t>
+            </a:r>
+          </a:p>
+          <a:p>
+            <a:pPr lvl="1"/>
+            <a:r>
+              <a:rPr lang="en-US" b="1" dirty="0"/>
+              <a:t>Repository</a:t>
+            </a:r>
+            <a:r>
+              <a:rPr lang="en-US" dirty="0"/>
+              <a:t> – Where changes are applied</a:t>
+            </a:r>
+          </a:p>
+          <a:p>
+            <a:r>
+              <a:rPr lang="en-US" dirty="0"/>
+              <a:t>It’s all hidden in the .git directory…</a:t>
+            </a:r>
+          </a:p>
+          <a:p>
+            <a:pPr lvl="1"/>
+            <a:r>
+              <a:rPr lang="en-US" dirty="0"/>
+              <a:t>objects/ stores snapshot (“commit”) metadata</a:t>
+            </a:r>
+          </a:p>
+          <a:p>
+            <a:pPr lvl="1"/>
+            <a:r>
+              <a:rPr lang="en-US" dirty="0"/>
+              <a:t>refs/ points to commits</a:t>
+            </a:r>
+          </a:p>
+          <a:p>
+            <a:pPr lvl="1"/>
+            <a:r>
+              <a:rPr lang="en-US" dirty="0"/>
+              <a:t>/index stores pointers to commits (e.g., branches)</a:t>
+            </a:r>
+          </a:p>
+          <a:p>
+            <a:pPr lvl="1"/>
+            <a:r>
+              <a:rPr lang="en-US" dirty="0"/>
+              <a:t>/HEAD points to current branch</a:t>
+            </a:r>
+          </a:p>
+        </p:txBody>
+      </p:sp>
+      <p:sp>
+        <p:nvSpPr>
+          <p:cNvPr id="8" name="TextBox 7">
+            <a:extLst>
+              <a:ext uri="{FF2B5EF4-FFF2-40B4-BE49-F238E27FC236}">
+                <a16:creationId xmlns:a16="http://schemas.microsoft.com/office/drawing/2014/main" id="{16C1EE27-5ED9-416E-8A67-FB6338B4B91C}"/>
+              </a:ext>
+            </a:extLst>
+          </p:cNvPr>
+          <p:cNvSpPr txBox="1"/>
+          <p:nvPr/>
+        </p:nvSpPr>
+        <p:spPr>
+          <a:xfrm>
+            <a:off x="0" y="6432897"/>
+            <a:ext cx="6936828" cy="276999"/>
+          </a:xfrm>
+          <a:prstGeom prst="rect">
+            <a:avLst/>
+          </a:prstGeom>
+          <a:noFill/>
+        </p:spPr>
+        <p:txBody>
+          <a:bodyPr wrap="square" rtlCol="0">
+            <a:spAutoFit/>
+          </a:bodyPr>
+          <a:lstStyle/>
+          <a:p>
+            <a:r>
+              <a:rPr lang="en-US" sz="1200" dirty="0">
+                <a:solidFill>
+                  <a:schemeClr val="bg2"/>
+                </a:solidFill>
+              </a:rPr>
+              <a:t>Sources: </a:t>
+            </a:r>
+            <a:r>
+              <a:rPr lang="en-US" sz="1200" dirty="0">
+                <a:solidFill>
+                  <a:schemeClr val="bg2"/>
+                </a:solidFill>
+                <a:hlinkClick r:id="rId2">
+                  <a:extLst>
+                    <a:ext uri="{A12FA001-AC4F-418D-AE19-62706E023703}">
+                      <ahyp:hlinkClr xmlns:ahyp="http://schemas.microsoft.com/office/drawing/2018/hyperlinkcolor" val="tx"/>
+                    </a:ext>
+                  </a:extLst>
+                </a:hlinkClick>
+              </a:rPr>
+              <a:t>https://developer.ibm.com/tutorials/d-learn-workings-git/</a:t>
+            </a:r>
+            <a:r>
+              <a:rPr lang="en-US" sz="1200" dirty="0">
+                <a:solidFill>
+                  <a:schemeClr val="bg2"/>
+                </a:solidFill>
+              </a:rPr>
+              <a:t>   </a:t>
+            </a:r>
+          </a:p>
+        </p:txBody>
+      </p:sp>
+      <p:pic>
+        <p:nvPicPr>
+          <p:cNvPr id="11" name="Picture 10" descr="Diagram&#10;&#10;Description automatically generated">
+            <a:extLst>
+              <a:ext uri="{FF2B5EF4-FFF2-40B4-BE49-F238E27FC236}">
+                <a16:creationId xmlns:a16="http://schemas.microsoft.com/office/drawing/2014/main" id="{07FFF1A8-DD09-4008-B76C-8C1AA184EAE1}"/>
+              </a:ext>
+            </a:extLst>
+          </p:cNvPr>
+          <p:cNvPicPr>
+            <a:picLocks noChangeAspect="1"/>
+          </p:cNvPicPr>
+          <p:nvPr/>
+        </p:nvPicPr>
+        <p:blipFill>
+          <a:blip r:embed="rId3">
+            <a:extLst>
+              <a:ext uri="{28A0092B-C50C-407E-A947-70E740481C1C}">
+                <a14:useLocalDpi xmlns:a14="http://schemas.microsoft.com/office/drawing/2010/main" val="0"/>
+              </a:ext>
+            </a:extLst>
+          </a:blip>
+          <a:stretch>
+            <a:fillRect/>
+          </a:stretch>
+        </p:blipFill>
+        <p:spPr>
+          <a:xfrm>
+            <a:off x="6936828" y="2621948"/>
+            <a:ext cx="4982752" cy="2470931"/>
+          </a:xfrm>
+          <a:prstGeom prst="rect">
+            <a:avLst/>
+          </a:prstGeom>
+        </p:spPr>
+      </p:pic>
     </p:spTree>
     <p:extLst>
       <p:ext uri="{BB962C8B-B14F-4D97-AF65-F5344CB8AC3E}">
-        <p14:creationId xmlns:p14="http://schemas.microsoft.com/office/powerpoint/2010/main" val="109136638"/>
+        <p14:creationId xmlns:p14="http://schemas.microsoft.com/office/powerpoint/2010/main" val="4162476691"/>
       </p:ext>
     </p:extLst>
   </p:cSld>
@@ -4496,19 +4975,853 @@
           <a:bodyPr/>
           <a:lstStyle/>
           <a:p>
-            <a:endParaRPr lang="en-US"/>
-          </a:p>
-        </p:txBody>
-      </p:sp>
-      <p:sp>
-        <p:nvSpPr>
-          <p:cNvPr id="3" name="Content Placeholder 2">
+            <a:r>
+              <a:rPr lang="en-US" dirty="0"/>
+              <a:t>Git or GitHub?</a:t>
+            </a:r>
+          </a:p>
+        </p:txBody>
+      </p:sp>
+      <p:grpSp>
+        <p:nvGrpSpPr>
+          <p:cNvPr id="36" name="Group 35">
             <a:extLst>
               <a:ext uri="{FF2B5EF4-FFF2-40B4-BE49-F238E27FC236}">
-                <a16:creationId xmlns:a16="http://schemas.microsoft.com/office/drawing/2014/main" id="{C36822C3-41DF-469F-8956-912A332FA942}"/>
+                <a16:creationId xmlns:a16="http://schemas.microsoft.com/office/drawing/2014/main" id="{97A1F960-9CD3-4C66-9C01-8CAB1BD3EA45}"/>
               </a:ext>
             </a:extLst>
           </p:cNvPr>
+          <p:cNvGrpSpPr/>
+          <p:nvPr/>
+        </p:nvGrpSpPr>
+        <p:grpSpPr>
+          <a:xfrm>
+            <a:off x="7335620" y="2009736"/>
+            <a:ext cx="4442547" cy="3709713"/>
+            <a:chOff x="7335620" y="2009736"/>
+            <a:chExt cx="4442547" cy="3709713"/>
+          </a:xfrm>
+        </p:grpSpPr>
+        <p:pic>
+          <p:nvPicPr>
+            <p:cNvPr id="24" name="Picture 23" descr="Icon&#10;&#10;Description automatically generated with low confidence">
+              <a:extLst>
+                <a:ext uri="{FF2B5EF4-FFF2-40B4-BE49-F238E27FC236}">
+                  <a16:creationId xmlns:a16="http://schemas.microsoft.com/office/drawing/2014/main" id="{A6C276A7-2E9A-4E15-B7AE-9ADD84FE6FA8}"/>
+                </a:ext>
+              </a:extLst>
+            </p:cNvPr>
+            <p:cNvPicPr>
+              <a:picLocks noChangeAspect="1"/>
+            </p:cNvPicPr>
+            <p:nvPr/>
+          </p:nvPicPr>
+          <p:blipFill>
+            <a:blip r:embed="rId2">
+              <a:extLst>
+                <a:ext uri="{28A0092B-C50C-407E-A947-70E740481C1C}">
+                  <a14:useLocalDpi xmlns:a14="http://schemas.microsoft.com/office/drawing/2010/main" val="0"/>
+                </a:ext>
+              </a:extLst>
+            </a:blip>
+            <a:stretch>
+              <a:fillRect/>
+            </a:stretch>
+          </p:blipFill>
+          <p:spPr>
+            <a:xfrm>
+              <a:off x="7335620" y="4832131"/>
+              <a:ext cx="1480849" cy="887318"/>
+            </a:xfrm>
+            <a:prstGeom prst="rect">
+              <a:avLst/>
+            </a:prstGeom>
+          </p:spPr>
+        </p:pic>
+        <p:pic>
+          <p:nvPicPr>
+            <p:cNvPr id="25" name="Picture 24" descr="Icon&#10;&#10;Description automatically generated with low confidence">
+              <a:extLst>
+                <a:ext uri="{FF2B5EF4-FFF2-40B4-BE49-F238E27FC236}">
+                  <a16:creationId xmlns:a16="http://schemas.microsoft.com/office/drawing/2014/main" id="{E1698C65-B92C-4FFD-B352-C070615CCFF9}"/>
+                </a:ext>
+              </a:extLst>
+            </p:cNvPr>
+            <p:cNvPicPr>
+              <a:picLocks noChangeAspect="1"/>
+            </p:cNvPicPr>
+            <p:nvPr/>
+          </p:nvPicPr>
+          <p:blipFill>
+            <a:blip r:embed="rId2">
+              <a:extLst>
+                <a:ext uri="{28A0092B-C50C-407E-A947-70E740481C1C}">
+                  <a14:useLocalDpi xmlns:a14="http://schemas.microsoft.com/office/drawing/2010/main" val="0"/>
+                </a:ext>
+              </a:extLst>
+            </a:blip>
+            <a:stretch>
+              <a:fillRect/>
+            </a:stretch>
+          </p:blipFill>
+          <p:spPr>
+            <a:xfrm>
+              <a:off x="8816469" y="4832131"/>
+              <a:ext cx="1480849" cy="887318"/>
+            </a:xfrm>
+            <a:prstGeom prst="rect">
+              <a:avLst/>
+            </a:prstGeom>
+          </p:spPr>
+        </p:pic>
+        <p:pic>
+          <p:nvPicPr>
+            <p:cNvPr id="26" name="Picture 25" descr="Icon&#10;&#10;Description automatically generated with low confidence">
+              <a:extLst>
+                <a:ext uri="{FF2B5EF4-FFF2-40B4-BE49-F238E27FC236}">
+                  <a16:creationId xmlns:a16="http://schemas.microsoft.com/office/drawing/2014/main" id="{E9138DEB-3AA5-41FE-8C5C-BF9D51513E80}"/>
+                </a:ext>
+              </a:extLst>
+            </p:cNvPr>
+            <p:cNvPicPr>
+              <a:picLocks noChangeAspect="1"/>
+            </p:cNvPicPr>
+            <p:nvPr/>
+          </p:nvPicPr>
+          <p:blipFill>
+            <a:blip r:embed="rId2">
+              <a:extLst>
+                <a:ext uri="{28A0092B-C50C-407E-A947-70E740481C1C}">
+                  <a14:useLocalDpi xmlns:a14="http://schemas.microsoft.com/office/drawing/2010/main" val="0"/>
+                </a:ext>
+              </a:extLst>
+            </a:blip>
+            <a:stretch>
+              <a:fillRect/>
+            </a:stretch>
+          </p:blipFill>
+          <p:spPr>
+            <a:xfrm>
+              <a:off x="10297318" y="4832131"/>
+              <a:ext cx="1480849" cy="887318"/>
+            </a:xfrm>
+            <a:prstGeom prst="rect">
+              <a:avLst/>
+            </a:prstGeom>
+          </p:spPr>
+        </p:pic>
+        <p:grpSp>
+          <p:nvGrpSpPr>
+            <p:cNvPr id="31" name="Group 30">
+              <a:extLst>
+                <a:ext uri="{FF2B5EF4-FFF2-40B4-BE49-F238E27FC236}">
+                  <a16:creationId xmlns:a16="http://schemas.microsoft.com/office/drawing/2014/main" id="{14E913DA-BF2C-450D-92B8-AFF1086B92F1}"/>
+                </a:ext>
+              </a:extLst>
+            </p:cNvPr>
+            <p:cNvGrpSpPr/>
+            <p:nvPr/>
+          </p:nvGrpSpPr>
+          <p:grpSpPr>
+            <a:xfrm>
+              <a:off x="8371930" y="2009736"/>
+              <a:ext cx="2101911" cy="1419264"/>
+              <a:chOff x="8369382" y="1623848"/>
+              <a:chExt cx="2101911" cy="1419264"/>
+            </a:xfrm>
+          </p:grpSpPr>
+          <p:pic>
+            <p:nvPicPr>
+              <p:cNvPr id="28" name="Picture 27">
+                <a:extLst>
+                  <a:ext uri="{FF2B5EF4-FFF2-40B4-BE49-F238E27FC236}">
+                    <a16:creationId xmlns:a16="http://schemas.microsoft.com/office/drawing/2014/main" id="{E302F5AC-B79B-4610-81E1-2407189322A5}"/>
+                  </a:ext>
+                </a:extLst>
+              </p:cNvPr>
+              <p:cNvPicPr>
+                <a:picLocks noChangeAspect="1"/>
+              </p:cNvPicPr>
+              <p:nvPr/>
+            </p:nvPicPr>
+            <p:blipFill>
+              <a:blip r:embed="rId3"/>
+              <a:stretch>
+                <a:fillRect/>
+              </a:stretch>
+            </p:blipFill>
+            <p:spPr>
+              <a:xfrm>
+                <a:off x="8369382" y="1855601"/>
+                <a:ext cx="1187511" cy="1187511"/>
+              </a:xfrm>
+              <a:prstGeom prst="rect">
+                <a:avLst/>
+              </a:prstGeom>
+            </p:spPr>
+          </p:pic>
+          <p:pic>
+            <p:nvPicPr>
+              <p:cNvPr id="30" name="Graphic 29" descr="Syncing cloud with solid fill">
+                <a:extLst>
+                  <a:ext uri="{FF2B5EF4-FFF2-40B4-BE49-F238E27FC236}">
+                    <a16:creationId xmlns:a16="http://schemas.microsoft.com/office/drawing/2014/main" id="{DEADDEB9-80A6-49A8-8CB0-CE3FE0B25E82}"/>
+                  </a:ext>
+                </a:extLst>
+              </p:cNvPr>
+              <p:cNvPicPr>
+                <a:picLocks noChangeAspect="1"/>
+              </p:cNvPicPr>
+              <p:nvPr/>
+            </p:nvPicPr>
+            <p:blipFill>
+              <a:blip r:embed="rId4">
+                <a:extLst>
+                  <a:ext uri="{28A0092B-C50C-407E-A947-70E740481C1C}">
+                    <a14:useLocalDpi xmlns:a14="http://schemas.microsoft.com/office/drawing/2010/main" val="0"/>
+                  </a:ext>
+                  <a:ext uri="{96DAC541-7B7A-43D3-8B79-37D633B846F1}">
+                    <asvg:svgBlip xmlns:asvg="http://schemas.microsoft.com/office/drawing/2016/SVG/main" r:embed="rId5"/>
+                  </a:ext>
+                </a:extLst>
+              </a:blip>
+              <a:stretch>
+                <a:fillRect/>
+              </a:stretch>
+            </p:blipFill>
+            <p:spPr>
+              <a:xfrm>
+                <a:off x="9556893" y="1623848"/>
+                <a:ext cx="914400" cy="914400"/>
+              </a:xfrm>
+              <a:prstGeom prst="rect">
+                <a:avLst/>
+              </a:prstGeom>
+            </p:spPr>
+          </p:pic>
+        </p:grpSp>
+        <p:grpSp>
+          <p:nvGrpSpPr>
+            <p:cNvPr id="34" name="Group 33">
+              <a:extLst>
+                <a:ext uri="{FF2B5EF4-FFF2-40B4-BE49-F238E27FC236}">
+                  <a16:creationId xmlns:a16="http://schemas.microsoft.com/office/drawing/2014/main" id="{B5C011FD-1EDE-432F-A3EF-969A5BF4CDF7}"/>
+                </a:ext>
+              </a:extLst>
+            </p:cNvPr>
+            <p:cNvGrpSpPr/>
+            <p:nvPr/>
+          </p:nvGrpSpPr>
+          <p:grpSpPr>
+            <a:xfrm>
+              <a:off x="7417477" y="3236294"/>
+              <a:ext cx="4280536" cy="1512701"/>
+              <a:chOff x="7417477" y="3236294"/>
+              <a:chExt cx="4280536" cy="1512701"/>
+            </a:xfrm>
+          </p:grpSpPr>
+          <p:sp>
+            <p:nvSpPr>
+              <p:cNvPr id="33" name="Left Brace 32">
+                <a:extLst>
+                  <a:ext uri="{FF2B5EF4-FFF2-40B4-BE49-F238E27FC236}">
+                    <a16:creationId xmlns:a16="http://schemas.microsoft.com/office/drawing/2014/main" id="{24C79E4E-13C0-4F60-A38E-37EBDE7F2AA5}"/>
+                  </a:ext>
+                </a:extLst>
+              </p:cNvPr>
+              <p:cNvSpPr/>
+              <p:nvPr/>
+            </p:nvSpPr>
+            <p:spPr>
+              <a:xfrm rot="5400000">
+                <a:off x="9325204" y="2376186"/>
+                <a:ext cx="465082" cy="4280536"/>
+              </a:xfrm>
+              <a:custGeom>
+                <a:avLst/>
+                <a:gdLst>
+                  <a:gd name="connsiteX0" fmla="*/ 465082 w 465082"/>
+                  <a:gd name="connsiteY0" fmla="*/ 4280536 h 4280536"/>
+                  <a:gd name="connsiteX1" fmla="*/ 232541 w 465082"/>
+                  <a:gd name="connsiteY1" fmla="*/ 4241781 h 4280536"/>
+                  <a:gd name="connsiteX2" fmla="*/ 232541 w 465082"/>
+                  <a:gd name="connsiteY2" fmla="*/ 3787974 h 4280536"/>
+                  <a:gd name="connsiteX3" fmla="*/ 232541 w 465082"/>
+                  <a:gd name="connsiteY3" fmla="*/ 3292912 h 4280536"/>
+                  <a:gd name="connsiteX4" fmla="*/ 232541 w 465082"/>
+                  <a:gd name="connsiteY4" fmla="*/ 2777223 h 4280536"/>
+                  <a:gd name="connsiteX5" fmla="*/ 232541 w 465082"/>
+                  <a:gd name="connsiteY5" fmla="*/ 2179023 h 4280536"/>
+                  <a:gd name="connsiteX6" fmla="*/ 0 w 465082"/>
+                  <a:gd name="connsiteY6" fmla="*/ 2140268 h 4280536"/>
+                  <a:gd name="connsiteX7" fmla="*/ 232541 w 465082"/>
+                  <a:gd name="connsiteY7" fmla="*/ 2101513 h 4280536"/>
+                  <a:gd name="connsiteX8" fmla="*/ 232541 w 465082"/>
+                  <a:gd name="connsiteY8" fmla="*/ 1627079 h 4280536"/>
+                  <a:gd name="connsiteX9" fmla="*/ 232541 w 465082"/>
+                  <a:gd name="connsiteY9" fmla="*/ 1173272 h 4280536"/>
+                  <a:gd name="connsiteX10" fmla="*/ 232541 w 465082"/>
+                  <a:gd name="connsiteY10" fmla="*/ 657582 h 4280536"/>
+                  <a:gd name="connsiteX11" fmla="*/ 232541 w 465082"/>
+                  <a:gd name="connsiteY11" fmla="*/ 38755 h 4280536"/>
+                  <a:gd name="connsiteX12" fmla="*/ 465082 w 465082"/>
+                  <a:gd name="connsiteY12" fmla="*/ 0 h 4280536"/>
+                  <a:gd name="connsiteX13" fmla="*/ 465082 w 465082"/>
+                  <a:gd name="connsiteY13" fmla="*/ 492262 h 4280536"/>
+                  <a:gd name="connsiteX14" fmla="*/ 465082 w 465082"/>
+                  <a:gd name="connsiteY14" fmla="*/ 898913 h 4280536"/>
+                  <a:gd name="connsiteX15" fmla="*/ 465082 w 465082"/>
+                  <a:gd name="connsiteY15" fmla="*/ 1433980 h 4280536"/>
+                  <a:gd name="connsiteX16" fmla="*/ 465082 w 465082"/>
+                  <a:gd name="connsiteY16" fmla="*/ 1840630 h 4280536"/>
+                  <a:gd name="connsiteX17" fmla="*/ 465082 w 465082"/>
+                  <a:gd name="connsiteY17" fmla="*/ 2332892 h 4280536"/>
+                  <a:gd name="connsiteX18" fmla="*/ 465082 w 465082"/>
+                  <a:gd name="connsiteY18" fmla="*/ 2825154 h 4280536"/>
+                  <a:gd name="connsiteX19" fmla="*/ 465082 w 465082"/>
+                  <a:gd name="connsiteY19" fmla="*/ 3317415 h 4280536"/>
+                  <a:gd name="connsiteX20" fmla="*/ 465082 w 465082"/>
+                  <a:gd name="connsiteY20" fmla="*/ 3809677 h 4280536"/>
+                  <a:gd name="connsiteX21" fmla="*/ 465082 w 465082"/>
+                  <a:gd name="connsiteY21" fmla="*/ 4280536 h 4280536"/>
+                  <a:gd name="connsiteX0" fmla="*/ 465082 w 465082"/>
+                  <a:gd name="connsiteY0" fmla="*/ 4280536 h 4280536"/>
+                  <a:gd name="connsiteX1" fmla="*/ 232541 w 465082"/>
+                  <a:gd name="connsiteY1" fmla="*/ 4241781 h 4280536"/>
+                  <a:gd name="connsiteX2" fmla="*/ 232541 w 465082"/>
+                  <a:gd name="connsiteY2" fmla="*/ 3684836 h 4280536"/>
+                  <a:gd name="connsiteX3" fmla="*/ 232541 w 465082"/>
+                  <a:gd name="connsiteY3" fmla="*/ 3169147 h 4280536"/>
+                  <a:gd name="connsiteX4" fmla="*/ 232541 w 465082"/>
+                  <a:gd name="connsiteY4" fmla="*/ 2179023 h 4280536"/>
+                  <a:gd name="connsiteX5" fmla="*/ 0 w 465082"/>
+                  <a:gd name="connsiteY5" fmla="*/ 2140268 h 4280536"/>
+                  <a:gd name="connsiteX6" fmla="*/ 232541 w 465082"/>
+                  <a:gd name="connsiteY6" fmla="*/ 2101513 h 4280536"/>
+                  <a:gd name="connsiteX7" fmla="*/ 232541 w 465082"/>
+                  <a:gd name="connsiteY7" fmla="*/ 1606451 h 4280536"/>
+                  <a:gd name="connsiteX8" fmla="*/ 232541 w 465082"/>
+                  <a:gd name="connsiteY8" fmla="*/ 1132017 h 4280536"/>
+                  <a:gd name="connsiteX9" fmla="*/ 232541 w 465082"/>
+                  <a:gd name="connsiteY9" fmla="*/ 616327 h 4280536"/>
+                  <a:gd name="connsiteX10" fmla="*/ 232541 w 465082"/>
+                  <a:gd name="connsiteY10" fmla="*/ 38755 h 4280536"/>
+                  <a:gd name="connsiteX11" fmla="*/ 465082 w 465082"/>
+                  <a:gd name="connsiteY11" fmla="*/ 0 h 4280536"/>
+                </a:gdLst>
+                <a:ahLst/>
+                <a:cxnLst>
+                  <a:cxn ang="0">
+                    <a:pos x="connsiteX0" y="connsiteY0"/>
+                  </a:cxn>
+                  <a:cxn ang="0">
+                    <a:pos x="connsiteX1" y="connsiteY1"/>
+                  </a:cxn>
+                  <a:cxn ang="0">
+                    <a:pos x="connsiteX2" y="connsiteY2"/>
+                  </a:cxn>
+                  <a:cxn ang="0">
+                    <a:pos x="connsiteX3" y="connsiteY3"/>
+                  </a:cxn>
+                  <a:cxn ang="0">
+                    <a:pos x="connsiteX4" y="connsiteY4"/>
+                  </a:cxn>
+                  <a:cxn ang="0">
+                    <a:pos x="connsiteX5" y="connsiteY5"/>
+                  </a:cxn>
+                  <a:cxn ang="0">
+                    <a:pos x="connsiteX6" y="connsiteY6"/>
+                  </a:cxn>
+                  <a:cxn ang="0">
+                    <a:pos x="connsiteX7" y="connsiteY7"/>
+                  </a:cxn>
+                  <a:cxn ang="0">
+                    <a:pos x="connsiteX8" y="connsiteY8"/>
+                  </a:cxn>
+                  <a:cxn ang="0">
+                    <a:pos x="connsiteX9" y="connsiteY9"/>
+                  </a:cxn>
+                  <a:cxn ang="0">
+                    <a:pos x="connsiteX10" y="connsiteY10"/>
+                  </a:cxn>
+                  <a:cxn ang="0">
+                    <a:pos x="connsiteX11" y="connsiteY11"/>
+                  </a:cxn>
+                </a:cxnLst>
+                <a:rect l="l" t="t" r="r" b="b"/>
+                <a:pathLst>
+                  <a:path w="465082" h="4280536" stroke="0" extrusionOk="0">
+                    <a:moveTo>
+                      <a:pt x="465082" y="4280536"/>
+                    </a:moveTo>
+                    <a:cubicBezTo>
+                      <a:pt x="335223" y="4284237"/>
+                      <a:pt x="227765" y="4259930"/>
+                      <a:pt x="232541" y="4241781"/>
+                    </a:cubicBezTo>
+                    <a:cubicBezTo>
+                      <a:pt x="190260" y="4029267"/>
+                      <a:pt x="260076" y="3881336"/>
+                      <a:pt x="232541" y="3787974"/>
+                    </a:cubicBezTo>
+                    <a:cubicBezTo>
+                      <a:pt x="205006" y="3694612"/>
+                      <a:pt x="281945" y="3435671"/>
+                      <a:pt x="232541" y="3292912"/>
+                    </a:cubicBezTo>
+                    <a:cubicBezTo>
+                      <a:pt x="183137" y="3150153"/>
+                      <a:pt x="238495" y="2908050"/>
+                      <a:pt x="232541" y="2777223"/>
+                    </a:cubicBezTo>
+                    <a:cubicBezTo>
+                      <a:pt x="226587" y="2646396"/>
+                      <a:pt x="290263" y="2419326"/>
+                      <a:pt x="232541" y="2179023"/>
+                    </a:cubicBezTo>
+                    <a:cubicBezTo>
+                      <a:pt x="258124" y="2172409"/>
+                      <a:pt x="114969" y="2135015"/>
+                      <a:pt x="0" y="2140268"/>
+                    </a:cubicBezTo>
+                    <a:cubicBezTo>
+                      <a:pt x="129732" y="2141439"/>
+                      <a:pt x="232394" y="2121648"/>
+                      <a:pt x="232541" y="2101513"/>
+                    </a:cubicBezTo>
+                    <a:cubicBezTo>
+                      <a:pt x="215993" y="1940948"/>
+                      <a:pt x="270851" y="1736685"/>
+                      <a:pt x="232541" y="1627079"/>
+                    </a:cubicBezTo>
+                    <a:cubicBezTo>
+                      <a:pt x="194231" y="1517473"/>
+                      <a:pt x="258382" y="1358200"/>
+                      <a:pt x="232541" y="1173272"/>
+                    </a:cubicBezTo>
+                    <a:cubicBezTo>
+                      <a:pt x="206700" y="988344"/>
+                      <a:pt x="274562" y="812651"/>
+                      <a:pt x="232541" y="657582"/>
+                    </a:cubicBezTo>
+                    <a:cubicBezTo>
+                      <a:pt x="190520" y="502513"/>
+                      <a:pt x="235256" y="250313"/>
+                      <a:pt x="232541" y="38755"/>
+                    </a:cubicBezTo>
+                    <a:cubicBezTo>
+                      <a:pt x="236605" y="16533"/>
+                      <a:pt x="335445" y="3280"/>
+                      <a:pt x="465082" y="0"/>
+                    </a:cubicBezTo>
+                    <a:cubicBezTo>
+                      <a:pt x="478669" y="194734"/>
+                      <a:pt x="447294" y="333756"/>
+                      <a:pt x="465082" y="492262"/>
+                    </a:cubicBezTo>
+                    <a:cubicBezTo>
+                      <a:pt x="482870" y="650768"/>
+                      <a:pt x="449940" y="735317"/>
+                      <a:pt x="465082" y="898913"/>
+                    </a:cubicBezTo>
+                    <a:cubicBezTo>
+                      <a:pt x="480224" y="1062509"/>
+                      <a:pt x="405302" y="1291671"/>
+                      <a:pt x="465082" y="1433980"/>
+                    </a:cubicBezTo>
+                    <a:cubicBezTo>
+                      <a:pt x="524862" y="1576289"/>
+                      <a:pt x="423750" y="1662807"/>
+                      <a:pt x="465082" y="1840630"/>
+                    </a:cubicBezTo>
+                    <a:cubicBezTo>
+                      <a:pt x="506414" y="2018453"/>
+                      <a:pt x="450974" y="2180132"/>
+                      <a:pt x="465082" y="2332892"/>
+                    </a:cubicBezTo>
+                    <a:cubicBezTo>
+                      <a:pt x="479190" y="2485652"/>
+                      <a:pt x="435649" y="2665183"/>
+                      <a:pt x="465082" y="2825154"/>
+                    </a:cubicBezTo>
+                    <a:cubicBezTo>
+                      <a:pt x="494515" y="2985125"/>
+                      <a:pt x="428230" y="3189097"/>
+                      <a:pt x="465082" y="3317415"/>
+                    </a:cubicBezTo>
+                    <a:cubicBezTo>
+                      <a:pt x="501934" y="3445733"/>
+                      <a:pt x="406296" y="3635286"/>
+                      <a:pt x="465082" y="3809677"/>
+                    </a:cubicBezTo>
+                    <a:cubicBezTo>
+                      <a:pt x="523868" y="3984068"/>
+                      <a:pt x="422763" y="4056467"/>
+                      <a:pt x="465082" y="4280536"/>
+                    </a:cubicBezTo>
+                    <a:close/>
+                  </a:path>
+                  <a:path w="465082" h="4280536" fill="none" extrusionOk="0">
+                    <a:moveTo>
+                      <a:pt x="465082" y="4280536"/>
+                    </a:moveTo>
+                    <a:cubicBezTo>
+                      <a:pt x="332040" y="4281611"/>
+                      <a:pt x="229558" y="4259216"/>
+                      <a:pt x="232541" y="4241781"/>
+                    </a:cubicBezTo>
+                    <a:cubicBezTo>
+                      <a:pt x="211548" y="3983428"/>
+                      <a:pt x="254475" y="3803978"/>
+                      <a:pt x="232541" y="3684836"/>
+                    </a:cubicBezTo>
+                    <a:cubicBezTo>
+                      <a:pt x="210607" y="3565695"/>
+                      <a:pt x="272316" y="3320004"/>
+                      <a:pt x="232541" y="3169147"/>
+                    </a:cubicBezTo>
+                    <a:cubicBezTo>
+                      <a:pt x="192766" y="3018290"/>
+                      <a:pt x="260144" y="2385389"/>
+                      <a:pt x="232541" y="2179023"/>
+                    </a:cubicBezTo>
+                    <a:cubicBezTo>
+                      <a:pt x="231872" y="2151404"/>
+                      <a:pt x="135330" y="2169195"/>
+                      <a:pt x="0" y="2140268"/>
+                    </a:cubicBezTo>
+                    <a:cubicBezTo>
+                      <a:pt x="132017" y="2138455"/>
+                      <a:pt x="230521" y="2119308"/>
+                      <a:pt x="232541" y="2101513"/>
+                    </a:cubicBezTo>
+                    <a:cubicBezTo>
+                      <a:pt x="207697" y="1981561"/>
+                      <a:pt x="259245" y="1716934"/>
+                      <a:pt x="232541" y="1606451"/>
+                    </a:cubicBezTo>
+                    <a:cubicBezTo>
+                      <a:pt x="205837" y="1495968"/>
+                      <a:pt x="264214" y="1266252"/>
+                      <a:pt x="232541" y="1132017"/>
+                    </a:cubicBezTo>
+                    <a:cubicBezTo>
+                      <a:pt x="200868" y="997782"/>
+                      <a:pt x="252318" y="807078"/>
+                      <a:pt x="232541" y="616327"/>
+                    </a:cubicBezTo>
+                    <a:cubicBezTo>
+                      <a:pt x="212764" y="425576"/>
+                      <a:pt x="280434" y="240029"/>
+                      <a:pt x="232541" y="38755"/>
+                    </a:cubicBezTo>
+                    <a:cubicBezTo>
+                      <a:pt x="235776" y="19235"/>
+                      <a:pt x="343656" y="27566"/>
+                      <a:pt x="465082" y="0"/>
+                    </a:cubicBezTo>
+                  </a:path>
+                </a:pathLst>
+              </a:custGeom>
+              <a:ln w="38100">
+                <a:extLst>
+                  <a:ext uri="{C807C97D-BFC1-408E-A445-0C87EB9F89A2}">
+                    <ask:lineSketchStyleProps xmlns:ask="http://schemas.microsoft.com/office/drawing/2018/sketchyshapes" sd="70388535">
+                      <a:prstGeom prst="leftBrace">
+                        <a:avLst/>
+                      </a:prstGeom>
+                      <ask:type>
+                        <ask:lineSketchScribble/>
+                      </ask:type>
+                    </ask:lineSketchStyleProps>
+                  </a:ext>
+                </a:extLst>
+              </a:ln>
+            </p:spPr>
+            <p:style>
+              <a:lnRef idx="1">
+                <a:schemeClr val="accent1"/>
+              </a:lnRef>
+              <a:fillRef idx="0">
+                <a:schemeClr val="accent1"/>
+              </a:fillRef>
+              <a:effectRef idx="0">
+                <a:schemeClr val="accent1"/>
+              </a:effectRef>
+              <a:fontRef idx="minor">
+                <a:schemeClr val="tx1"/>
+              </a:fontRef>
+            </p:style>
+            <p:txBody>
+              <a:bodyPr rtlCol="0" anchor="ctr"/>
+              <a:lstStyle/>
+              <a:p>
+                <a:pPr algn="ctr"/>
+                <a:endParaRPr lang="en-US"/>
+              </a:p>
+            </p:txBody>
+          </p:sp>
+          <p:sp>
+            <p:nvSpPr>
+              <p:cNvPr id="32" name="Arrow: Right 31">
+                <a:extLst>
+                  <a:ext uri="{FF2B5EF4-FFF2-40B4-BE49-F238E27FC236}">
+                    <a16:creationId xmlns:a16="http://schemas.microsoft.com/office/drawing/2014/main" id="{4CFEE6A3-ADD3-4DEA-A034-5984C81B1116}"/>
+                  </a:ext>
+                </a:extLst>
+              </p:cNvPr>
+              <p:cNvSpPr/>
+              <p:nvPr/>
+            </p:nvSpPr>
+            <p:spPr>
+              <a:xfrm rot="16200000">
+                <a:off x="8925548" y="3830654"/>
+                <a:ext cx="1280160" cy="91440"/>
+              </a:xfrm>
+              <a:custGeom>
+                <a:avLst/>
+                <a:gdLst>
+                  <a:gd name="connsiteX0" fmla="*/ 0 w 1280160"/>
+                  <a:gd name="connsiteY0" fmla="*/ 22860 h 91440"/>
+                  <a:gd name="connsiteX1" fmla="*/ 423824 w 1280160"/>
+                  <a:gd name="connsiteY1" fmla="*/ 22860 h 91440"/>
+                  <a:gd name="connsiteX2" fmla="*/ 810616 w 1280160"/>
+                  <a:gd name="connsiteY2" fmla="*/ 22860 h 91440"/>
+                  <a:gd name="connsiteX3" fmla="*/ 1234440 w 1280160"/>
+                  <a:gd name="connsiteY3" fmla="*/ 22860 h 91440"/>
+                  <a:gd name="connsiteX4" fmla="*/ 1234440 w 1280160"/>
+                  <a:gd name="connsiteY4" fmla="*/ 0 h 91440"/>
+                  <a:gd name="connsiteX5" fmla="*/ 1280160 w 1280160"/>
+                  <a:gd name="connsiteY5" fmla="*/ 45720 h 91440"/>
+                  <a:gd name="connsiteX6" fmla="*/ 1234440 w 1280160"/>
+                  <a:gd name="connsiteY6" fmla="*/ 91440 h 91440"/>
+                  <a:gd name="connsiteX7" fmla="*/ 1234440 w 1280160"/>
+                  <a:gd name="connsiteY7" fmla="*/ 68580 h 91440"/>
+                  <a:gd name="connsiteX8" fmla="*/ 835304 w 1280160"/>
+                  <a:gd name="connsiteY8" fmla="*/ 68580 h 91440"/>
+                  <a:gd name="connsiteX9" fmla="*/ 411480 w 1280160"/>
+                  <a:gd name="connsiteY9" fmla="*/ 68580 h 91440"/>
+                  <a:gd name="connsiteX10" fmla="*/ 0 w 1280160"/>
+                  <a:gd name="connsiteY10" fmla="*/ 68580 h 91440"/>
+                  <a:gd name="connsiteX11" fmla="*/ 0 w 1280160"/>
+                  <a:gd name="connsiteY11" fmla="*/ 22860 h 91440"/>
+                </a:gdLst>
+                <a:ahLst/>
+                <a:cxnLst>
+                  <a:cxn ang="0">
+                    <a:pos x="connsiteX0" y="connsiteY0"/>
+                  </a:cxn>
+                  <a:cxn ang="0">
+                    <a:pos x="connsiteX1" y="connsiteY1"/>
+                  </a:cxn>
+                  <a:cxn ang="0">
+                    <a:pos x="connsiteX2" y="connsiteY2"/>
+                  </a:cxn>
+                  <a:cxn ang="0">
+                    <a:pos x="connsiteX3" y="connsiteY3"/>
+                  </a:cxn>
+                  <a:cxn ang="0">
+                    <a:pos x="connsiteX4" y="connsiteY4"/>
+                  </a:cxn>
+                  <a:cxn ang="0">
+                    <a:pos x="connsiteX5" y="connsiteY5"/>
+                  </a:cxn>
+                  <a:cxn ang="0">
+                    <a:pos x="connsiteX6" y="connsiteY6"/>
+                  </a:cxn>
+                  <a:cxn ang="0">
+                    <a:pos x="connsiteX7" y="connsiteY7"/>
+                  </a:cxn>
+                  <a:cxn ang="0">
+                    <a:pos x="connsiteX8" y="connsiteY8"/>
+                  </a:cxn>
+                  <a:cxn ang="0">
+                    <a:pos x="connsiteX9" y="connsiteY9"/>
+                  </a:cxn>
+                  <a:cxn ang="0">
+                    <a:pos x="connsiteX10" y="connsiteY10"/>
+                  </a:cxn>
+                  <a:cxn ang="0">
+                    <a:pos x="connsiteX11" y="connsiteY11"/>
+                  </a:cxn>
+                </a:cxnLst>
+                <a:rect l="l" t="t" r="r" b="b"/>
+                <a:pathLst>
+                  <a:path w="1280160" h="91440" fill="none" extrusionOk="0">
+                    <a:moveTo>
+                      <a:pt x="0" y="22860"/>
+                    </a:moveTo>
+                    <a:cubicBezTo>
+                      <a:pt x="189433" y="-8435"/>
+                      <a:pt x="323214" y="61962"/>
+                      <a:pt x="423824" y="22860"/>
+                    </a:cubicBezTo>
+                    <a:cubicBezTo>
+                      <a:pt x="524434" y="-16242"/>
+                      <a:pt x="657061" y="39636"/>
+                      <a:pt x="810616" y="22860"/>
+                    </a:cubicBezTo>
+                    <a:cubicBezTo>
+                      <a:pt x="964171" y="6084"/>
+                      <a:pt x="1047127" y="72441"/>
+                      <a:pt x="1234440" y="22860"/>
+                    </a:cubicBezTo>
+                    <a:cubicBezTo>
+                      <a:pt x="1231922" y="18043"/>
+                      <a:pt x="1237092" y="4853"/>
+                      <a:pt x="1234440" y="0"/>
+                    </a:cubicBezTo>
+                    <a:cubicBezTo>
+                      <a:pt x="1248945" y="5982"/>
+                      <a:pt x="1265145" y="37327"/>
+                      <a:pt x="1280160" y="45720"/>
+                    </a:cubicBezTo>
+                    <a:cubicBezTo>
+                      <a:pt x="1263489" y="64556"/>
+                      <a:pt x="1240970" y="76370"/>
+                      <a:pt x="1234440" y="91440"/>
+                    </a:cubicBezTo>
+                    <a:cubicBezTo>
+                      <a:pt x="1231972" y="85315"/>
+                      <a:pt x="1235450" y="76347"/>
+                      <a:pt x="1234440" y="68580"/>
+                    </a:cubicBezTo>
+                    <a:cubicBezTo>
+                      <a:pt x="1146366" y="85071"/>
+                      <a:pt x="967749" y="65985"/>
+                      <a:pt x="835304" y="68580"/>
+                    </a:cubicBezTo>
+                    <a:cubicBezTo>
+                      <a:pt x="702859" y="71175"/>
+                      <a:pt x="576883" y="61756"/>
+                      <a:pt x="411480" y="68580"/>
+                    </a:cubicBezTo>
+                    <a:cubicBezTo>
+                      <a:pt x="246077" y="75404"/>
+                      <a:pt x="149053" y="38457"/>
+                      <a:pt x="0" y="68580"/>
+                    </a:cubicBezTo>
+                    <a:cubicBezTo>
+                      <a:pt x="-1807" y="58495"/>
+                      <a:pt x="3415" y="45172"/>
+                      <a:pt x="0" y="22860"/>
+                    </a:cubicBezTo>
+                    <a:close/>
+                  </a:path>
+                  <a:path w="1280160" h="91440" stroke="0" extrusionOk="0">
+                    <a:moveTo>
+                      <a:pt x="0" y="22860"/>
+                    </a:moveTo>
+                    <a:cubicBezTo>
+                      <a:pt x="94095" y="-669"/>
+                      <a:pt x="247466" y="29917"/>
+                      <a:pt x="374447" y="22860"/>
+                    </a:cubicBezTo>
+                    <a:cubicBezTo>
+                      <a:pt x="501428" y="15803"/>
+                      <a:pt x="596533" y="28849"/>
+                      <a:pt x="785927" y="22860"/>
+                    </a:cubicBezTo>
+                    <a:cubicBezTo>
+                      <a:pt x="975321" y="16871"/>
+                      <a:pt x="1021363" y="34574"/>
+                      <a:pt x="1234440" y="22860"/>
+                    </a:cubicBezTo>
+                    <a:cubicBezTo>
+                      <a:pt x="1233410" y="18238"/>
+                      <a:pt x="1237041" y="8988"/>
+                      <a:pt x="1234440" y="0"/>
+                    </a:cubicBezTo>
+                    <a:cubicBezTo>
+                      <a:pt x="1245116" y="8893"/>
+                      <a:pt x="1260452" y="26784"/>
+                      <a:pt x="1280160" y="45720"/>
+                    </a:cubicBezTo>
+                    <a:cubicBezTo>
+                      <a:pt x="1264610" y="69633"/>
+                      <a:pt x="1248932" y="68380"/>
+                      <a:pt x="1234440" y="91440"/>
+                    </a:cubicBezTo>
+                    <a:cubicBezTo>
+                      <a:pt x="1232749" y="86433"/>
+                      <a:pt x="1236855" y="74792"/>
+                      <a:pt x="1234440" y="68580"/>
+                    </a:cubicBezTo>
+                    <a:cubicBezTo>
+                      <a:pt x="1059826" y="85214"/>
+                      <a:pt x="1006446" y="33727"/>
+                      <a:pt x="798271" y="68580"/>
+                    </a:cubicBezTo>
+                    <a:cubicBezTo>
+                      <a:pt x="590096" y="103433"/>
+                      <a:pt x="555807" y="37752"/>
+                      <a:pt x="386791" y="68580"/>
+                    </a:cubicBezTo>
+                    <a:cubicBezTo>
+                      <a:pt x="217775" y="99408"/>
+                      <a:pt x="143717" y="37225"/>
+                      <a:pt x="0" y="68580"/>
+                    </a:cubicBezTo>
+                    <a:cubicBezTo>
+                      <a:pt x="-3076" y="57483"/>
+                      <a:pt x="204" y="43755"/>
+                      <a:pt x="0" y="22860"/>
+                    </a:cubicBezTo>
+                    <a:close/>
+                  </a:path>
+                </a:pathLst>
+              </a:custGeom>
+              <a:ln>
+                <a:extLst>
+                  <a:ext uri="{C807C97D-BFC1-408E-A445-0C87EB9F89A2}">
+                    <ask:lineSketchStyleProps xmlns:ask="http://schemas.microsoft.com/office/drawing/2018/sketchyshapes" sd="1398590423">
+                      <a:prstGeom prst="rightArrow">
+                        <a:avLst/>
+                      </a:prstGeom>
+                      <ask:type>
+                        <ask:lineSketchScribble/>
+                      </ask:type>
+                    </ask:lineSketchStyleProps>
+                  </a:ext>
+                </a:extLst>
+              </a:ln>
+            </p:spPr>
+            <p:style>
+              <a:lnRef idx="2">
+                <a:schemeClr val="accent1">
+                  <a:shade val="50000"/>
+                </a:schemeClr>
+              </a:lnRef>
+              <a:fillRef idx="1">
+                <a:schemeClr val="accent1"/>
+              </a:fillRef>
+              <a:effectRef idx="0">
+                <a:schemeClr val="accent1"/>
+              </a:effectRef>
+              <a:fontRef idx="minor">
+                <a:schemeClr val="lt1"/>
+              </a:fontRef>
+            </p:style>
+            <p:txBody>
+              <a:bodyPr rtlCol="0" anchor="ctr"/>
+              <a:lstStyle/>
+              <a:p>
+                <a:pPr algn="ctr"/>
+                <a:endParaRPr lang="en-US"/>
+              </a:p>
+            </p:txBody>
+          </p:sp>
+        </p:grpSp>
+      </p:grpSp>
+      <p:sp>
+        <p:nvSpPr>
+          <p:cNvPr id="35" name="Content Placeholder 2">
+            <a:extLst>
+              <a:ext uri="{FF2B5EF4-FFF2-40B4-BE49-F238E27FC236}">
+                <a16:creationId xmlns:a16="http://schemas.microsoft.com/office/drawing/2014/main" id="{BE215A45-6334-41DE-AEF1-C9A27C3908C1}"/>
+              </a:ext>
+            </a:extLst>
+          </p:cNvPr>
           <p:cNvSpPr>
             <a:spLocks noGrp="1"/>
           </p:cNvSpPr>
@@ -4516,19 +5829,34 @@
             <p:ph idx="1"/>
           </p:nvPr>
         </p:nvSpPr>
-        <p:spPr/>
+        <p:spPr>
+          <a:xfrm>
+            <a:off x="1097279" y="1845734"/>
+            <a:ext cx="6107561" cy="4023360"/>
+          </a:xfrm>
+        </p:spPr>
         <p:txBody>
           <a:bodyPr/>
           <a:lstStyle/>
           <a:p>
-            <a:endParaRPr lang="en-US"/>
+            <a:r>
+              <a:rPr lang="en-US" dirty="0"/>
+              <a:t>GitHub is a centralized, online hub for hosting &amp; managing projects using Git</a:t>
+            </a:r>
+          </a:p>
+          <a:p>
+            <a:pPr lvl="1"/>
+            <a:r>
+              <a:rPr lang="en-US" dirty="0"/>
+              <a:t>In a sense, provides a visual representation of what Git does, which enables simpler hosting, collaborating, &amp; sharing</a:t>
+            </a:r>
           </a:p>
         </p:txBody>
       </p:sp>
     </p:spTree>
     <p:extLst>
       <p:ext uri="{BB962C8B-B14F-4D97-AF65-F5344CB8AC3E}">
-        <p14:creationId xmlns:p14="http://schemas.microsoft.com/office/powerpoint/2010/main" val="2411260650"/>
+        <p14:creationId xmlns:p14="http://schemas.microsoft.com/office/powerpoint/2010/main" val="109136638"/>
       </p:ext>
     </p:extLst>
   </p:cSld>
@@ -4576,16 +5904,19 @@
           <a:bodyPr/>
           <a:lstStyle/>
           <a:p>
-            <a:endParaRPr lang="en-US"/>
-          </a:p>
-        </p:txBody>
-      </p:sp>
-      <p:sp>
-        <p:nvSpPr>
-          <p:cNvPr id="3" name="Content Placeholder 2">
+            <a:r>
+              <a:rPr lang="en-US" dirty="0"/>
+              <a:t>Git or GitHub?</a:t>
+            </a:r>
+          </a:p>
+        </p:txBody>
+      </p:sp>
+      <p:sp>
+        <p:nvSpPr>
+          <p:cNvPr id="4" name="Content Placeholder 3">
             <a:extLst>
               <a:ext uri="{FF2B5EF4-FFF2-40B4-BE49-F238E27FC236}">
-                <a16:creationId xmlns:a16="http://schemas.microsoft.com/office/drawing/2014/main" id="{C36822C3-41DF-469F-8956-912A332FA942}"/>
+                <a16:creationId xmlns:a16="http://schemas.microsoft.com/office/drawing/2014/main" id="{33E8E3F2-2529-4C82-B7A2-210232857135}"/>
               </a:ext>
             </a:extLst>
           </p:cNvPr>
@@ -4601,14 +5932,50 @@
           <a:bodyPr/>
           <a:lstStyle/>
           <a:p>
-            <a:endParaRPr lang="en-US"/>
-          </a:p>
-        </p:txBody>
-      </p:sp>
+            <a:endParaRPr lang="en-US" dirty="0"/>
+          </a:p>
+        </p:txBody>
+      </p:sp>
+      <p:pic>
+        <p:nvPicPr>
+          <p:cNvPr id="17" name="Picture 16" descr="Graphical user interface, text, application, email&#10;&#10;Description automatically generated">
+            <a:extLst>
+              <a:ext uri="{FF2B5EF4-FFF2-40B4-BE49-F238E27FC236}">
+                <a16:creationId xmlns:a16="http://schemas.microsoft.com/office/drawing/2014/main" id="{B2911D1C-258B-46E3-B57D-76FD938A3EEA}"/>
+              </a:ext>
+            </a:extLst>
+          </p:cNvPr>
+          <p:cNvPicPr>
+            <a:picLocks noChangeAspect="1"/>
+          </p:cNvPicPr>
+          <p:nvPr/>
+        </p:nvPicPr>
+        <p:blipFill>
+          <a:blip r:embed="rId2">
+            <a:extLst>
+              <a:ext uri="{28A0092B-C50C-407E-A947-70E740481C1C}">
+                <a14:useLocalDpi xmlns:a14="http://schemas.microsoft.com/office/drawing/2010/main" val="0"/>
+              </a:ext>
+            </a:extLst>
+          </a:blip>
+          <a:stretch>
+            <a:fillRect/>
+          </a:stretch>
+        </p:blipFill>
+        <p:spPr>
+          <a:xfrm>
+            <a:off x="127701" y="545109"/>
+            <a:ext cx="11932919" cy="5625611"/>
+          </a:xfrm>
+          <a:prstGeom prst="rect">
+            <a:avLst/>
+          </a:prstGeom>
+        </p:spPr>
+      </p:pic>
     </p:spTree>
     <p:extLst>
       <p:ext uri="{BB962C8B-B14F-4D97-AF65-F5344CB8AC3E}">
-        <p14:creationId xmlns:p14="http://schemas.microsoft.com/office/powerpoint/2010/main" val="1735832946"/>
+        <p14:creationId xmlns:p14="http://schemas.microsoft.com/office/powerpoint/2010/main" val="2246122900"/>
       </p:ext>
     </p:extLst>
   </p:cSld>
@@ -4656,7 +6023,10 @@
           <a:bodyPr/>
           <a:lstStyle/>
           <a:p>
-            <a:endParaRPr lang="en-US"/>
+            <a:r>
+              <a:rPr lang="en-US" dirty="0"/>
+              <a:t>Setting up Git/Hub</a:t>
+            </a:r>
           </a:p>
         </p:txBody>
       </p:sp>
@@ -4688,7 +6058,87 @@
     </p:spTree>
     <p:extLst>
       <p:ext uri="{BB962C8B-B14F-4D97-AF65-F5344CB8AC3E}">
-        <p14:creationId xmlns:p14="http://schemas.microsoft.com/office/powerpoint/2010/main" val="3310373015"/>
+        <p14:creationId xmlns:p14="http://schemas.microsoft.com/office/powerpoint/2010/main" val="2411260650"/>
+      </p:ext>
+    </p:extLst>
+  </p:cSld>
+  <p:clrMapOvr>
+    <a:masterClrMapping/>
+  </p:clrMapOvr>
+</p:sld>
+</file>
+
+<file path=ppt/slides/slide9.xml><?xml version="1.0" encoding="utf-8"?>
+<p:sld xmlns:a="http://schemas.openxmlformats.org/drawingml/2006/main" xmlns:r="http://schemas.openxmlformats.org/officeDocument/2006/relationships" xmlns:p="http://schemas.openxmlformats.org/presentationml/2006/main">
+  <p:cSld>
+    <p:spTree>
+      <p:nvGrpSpPr>
+        <p:cNvPr id="1" name=""/>
+        <p:cNvGrpSpPr/>
+        <p:nvPr/>
+      </p:nvGrpSpPr>
+      <p:grpSpPr>
+        <a:xfrm>
+          <a:off x="0" y="0"/>
+          <a:ext cx="0" cy="0"/>
+          <a:chOff x="0" y="0"/>
+          <a:chExt cx="0" cy="0"/>
+        </a:xfrm>
+      </p:grpSpPr>
+      <p:sp>
+        <p:nvSpPr>
+          <p:cNvPr id="2" name="Title 1">
+            <a:extLst>
+              <a:ext uri="{FF2B5EF4-FFF2-40B4-BE49-F238E27FC236}">
+                <a16:creationId xmlns:a16="http://schemas.microsoft.com/office/drawing/2014/main" id="{4DF178C7-120D-4AE8-B26F-BFA3959D9798}"/>
+              </a:ext>
+            </a:extLst>
+          </p:cNvPr>
+          <p:cNvSpPr>
+            <a:spLocks noGrp="1"/>
+          </p:cNvSpPr>
+          <p:nvPr>
+            <p:ph type="title"/>
+          </p:nvPr>
+        </p:nvSpPr>
+        <p:spPr/>
+        <p:txBody>
+          <a:bodyPr/>
+          <a:lstStyle/>
+          <a:p>
+            <a:endParaRPr lang="en-US"/>
+          </a:p>
+        </p:txBody>
+      </p:sp>
+      <p:sp>
+        <p:nvSpPr>
+          <p:cNvPr id="3" name="Content Placeholder 2">
+            <a:extLst>
+              <a:ext uri="{FF2B5EF4-FFF2-40B4-BE49-F238E27FC236}">
+                <a16:creationId xmlns:a16="http://schemas.microsoft.com/office/drawing/2014/main" id="{C36822C3-41DF-469F-8956-912A332FA942}"/>
+              </a:ext>
+            </a:extLst>
+          </p:cNvPr>
+          <p:cNvSpPr>
+            <a:spLocks noGrp="1"/>
+          </p:cNvSpPr>
+          <p:nvPr>
+            <p:ph idx="1"/>
+          </p:nvPr>
+        </p:nvSpPr>
+        <p:spPr/>
+        <p:txBody>
+          <a:bodyPr/>
+          <a:lstStyle/>
+          <a:p>
+            <a:endParaRPr lang="en-US"/>
+          </a:p>
+        </p:txBody>
+      </p:sp>
+    </p:spTree>
+    <p:extLst>
+      <p:ext uri="{BB962C8B-B14F-4D97-AF65-F5344CB8AC3E}">
+        <p14:creationId xmlns:p14="http://schemas.microsoft.com/office/powerpoint/2010/main" val="1735832946"/>
       </p:ext>
     </p:extLst>
   </p:cSld>
@@ -4701,7 +6151,7 @@
 <file path=ppt/theme/theme1.xml><?xml version="1.0" encoding="utf-8"?>
 <a:theme xmlns:a="http://schemas.openxmlformats.org/drawingml/2006/main" name="Retrospect">
   <a:themeElements>
-    <a:clrScheme name="Retrospect">
+    <a:clrScheme name="Custom 1">
       <a:dk1>
         <a:sysClr val="windowText" lastClr="000000"/>
       </a:dk1>
@@ -4733,7 +6183,7 @@
         <a:srgbClr val="855D5D"/>
       </a:accent6>
       <a:hlink>
-        <a:srgbClr val="CC9900"/>
+        <a:srgbClr val="0070C0"/>
       </a:hlink>
       <a:folHlink>
         <a:srgbClr val="96A9A9"/>

</xml_diff>